<commit_message>
Update retard & MAJsuspension bdd
</commit_message>
<xml_diff>
--- a/doc/diagramme_de_classe.pptx
+++ b/doc/diagramme_de_classe.pptx
@@ -243,7 +243,7 @@
           <a:p>
             <a:fld id="{12DDF852-BC86-4183-8225-73552CEA440A}" type="datetimeFigureOut">
               <a:rPr lang="fr-FR" smtClean="0"/>
-              <a:t>22/03/2017</a:t>
+              <a:t>21/04/2017</a:t>
             </a:fld>
             <a:endParaRPr lang="fr-FR"/>
           </a:p>
@@ -413,7 +413,7 @@
           <a:p>
             <a:fld id="{12DDF852-BC86-4183-8225-73552CEA440A}" type="datetimeFigureOut">
               <a:rPr lang="fr-FR" smtClean="0"/>
-              <a:t>22/03/2017</a:t>
+              <a:t>21/04/2017</a:t>
             </a:fld>
             <a:endParaRPr lang="fr-FR"/>
           </a:p>
@@ -593,7 +593,7 @@
           <a:p>
             <a:fld id="{12DDF852-BC86-4183-8225-73552CEA440A}" type="datetimeFigureOut">
               <a:rPr lang="fr-FR" smtClean="0"/>
-              <a:t>22/03/2017</a:t>
+              <a:t>21/04/2017</a:t>
             </a:fld>
             <a:endParaRPr lang="fr-FR"/>
           </a:p>
@@ -763,7 +763,7 @@
           <a:p>
             <a:fld id="{12DDF852-BC86-4183-8225-73552CEA440A}" type="datetimeFigureOut">
               <a:rPr lang="fr-FR" smtClean="0"/>
-              <a:t>22/03/2017</a:t>
+              <a:t>21/04/2017</a:t>
             </a:fld>
             <a:endParaRPr lang="fr-FR"/>
           </a:p>
@@ -1009,7 +1009,7 @@
           <a:p>
             <a:fld id="{12DDF852-BC86-4183-8225-73552CEA440A}" type="datetimeFigureOut">
               <a:rPr lang="fr-FR" smtClean="0"/>
-              <a:t>22/03/2017</a:t>
+              <a:t>21/04/2017</a:t>
             </a:fld>
             <a:endParaRPr lang="fr-FR"/>
           </a:p>
@@ -1241,7 +1241,7 @@
           <a:p>
             <a:fld id="{12DDF852-BC86-4183-8225-73552CEA440A}" type="datetimeFigureOut">
               <a:rPr lang="fr-FR" smtClean="0"/>
-              <a:t>22/03/2017</a:t>
+              <a:t>21/04/2017</a:t>
             </a:fld>
             <a:endParaRPr lang="fr-FR"/>
           </a:p>
@@ -1608,7 +1608,7 @@
           <a:p>
             <a:fld id="{12DDF852-BC86-4183-8225-73552CEA440A}" type="datetimeFigureOut">
               <a:rPr lang="fr-FR" smtClean="0"/>
-              <a:t>22/03/2017</a:t>
+              <a:t>21/04/2017</a:t>
             </a:fld>
             <a:endParaRPr lang="fr-FR"/>
           </a:p>
@@ -1726,7 +1726,7 @@
           <a:p>
             <a:fld id="{12DDF852-BC86-4183-8225-73552CEA440A}" type="datetimeFigureOut">
               <a:rPr lang="fr-FR" smtClean="0"/>
-              <a:t>22/03/2017</a:t>
+              <a:t>21/04/2017</a:t>
             </a:fld>
             <a:endParaRPr lang="fr-FR"/>
           </a:p>
@@ -1821,7 +1821,7 @@
           <a:p>
             <a:fld id="{12DDF852-BC86-4183-8225-73552CEA440A}" type="datetimeFigureOut">
               <a:rPr lang="fr-FR" smtClean="0"/>
-              <a:t>22/03/2017</a:t>
+              <a:t>21/04/2017</a:t>
             </a:fld>
             <a:endParaRPr lang="fr-FR"/>
           </a:p>
@@ -2098,7 +2098,7 @@
           <a:p>
             <a:fld id="{12DDF852-BC86-4183-8225-73552CEA440A}" type="datetimeFigureOut">
               <a:rPr lang="fr-FR" smtClean="0"/>
-              <a:t>22/03/2017</a:t>
+              <a:t>21/04/2017</a:t>
             </a:fld>
             <a:endParaRPr lang="fr-FR"/>
           </a:p>
@@ -2351,7 +2351,7 @@
           <a:p>
             <a:fld id="{12DDF852-BC86-4183-8225-73552CEA440A}" type="datetimeFigureOut">
               <a:rPr lang="fr-FR" smtClean="0"/>
-              <a:t>22/03/2017</a:t>
+              <a:t>21/04/2017</a:t>
             </a:fld>
             <a:endParaRPr lang="fr-FR"/>
           </a:p>
@@ -2564,7 +2564,7 @@
           <a:p>
             <a:fld id="{12DDF852-BC86-4183-8225-73552CEA440A}" type="datetimeFigureOut">
               <a:rPr lang="fr-FR" smtClean="0"/>
-              <a:t>22/03/2017</a:t>
+              <a:t>21/04/2017</a:t>
             </a:fld>
             <a:endParaRPr lang="fr-FR"/>
           </a:p>
@@ -3105,7 +3105,7 @@
       </p:cxnSp>
       <p:pic>
         <p:nvPicPr>
-          <p:cNvPr id="2" name="Image 1"/>
+          <p:cNvPr id="3" name="Image 2"/>
           <p:cNvPicPr>
             <a:picLocks noChangeAspect="1"/>
           </p:cNvPicPr>
@@ -3125,8 +3125,8 @@
         </p:blipFill>
         <p:spPr>
           <a:xfrm>
-            <a:off x="2354262" y="386625"/>
-            <a:ext cx="7534275" cy="6724650"/>
+            <a:off x="1728539" y="386624"/>
+            <a:ext cx="8756769" cy="6734889"/>
           </a:xfrm>
           <a:prstGeom prst="rect">
             <a:avLst/>

</xml_diff>